<commit_message>
Update slide deck 2
</commit_message>
<xml_diff>
--- a/02-testing.pptx
+++ b/02-testing.pptx
@@ -268,7 +268,7 @@
               <a:rPr lang="en-US" smtClean="0">
                 <a:latin typeface="Segoe UI" pitchFamily="34" charset="0"/>
               </a:rPr>
-              <a:t>8/22/2020 2:40 PM</a:t>
+              <a:t>10/23/2021 8:51 AM</a:t>
             </a:fld>
             <a:endParaRPr lang="en-US" dirty="0">
               <a:latin typeface="Segoe UI" pitchFamily="34" charset="0"/>
@@ -565,7 +565,7 @@
           <a:p>
             <a:fld id="{D18B56EA-E28F-4F92-9F16-7A6F2501B303}" type="datetime8">
               <a:rPr lang="en-US" smtClean="0"/>
-              <a:t>8/22/2020 2:40 PM</a:t>
+              <a:t>10/23/2021 8:51 AM</a:t>
             </a:fld>
             <a:endParaRPr lang="en-US" dirty="0"/>
           </a:p>
@@ -948,7 +948,7 @@
           <a:p>
             <a:fld id="{D18B56EA-E28F-4F92-9F16-7A6F2501B303}" type="datetime8">
               <a:rPr lang="en-US" smtClean="0"/>
-              <a:t>8/22/2020 2:40 PM</a:t>
+              <a:t>10/23/2021 8:51 AM</a:t>
             </a:fld>
             <a:endParaRPr lang="en-US" dirty="0"/>
           </a:p>
@@ -1129,7 +1129,7 @@
           <a:p>
             <a:fld id="{D18B56EA-E28F-4F92-9F16-7A6F2501B303}" type="datetime8">
               <a:rPr lang="en-US" smtClean="0"/>
-              <a:t>8/22/2020 2:40 PM</a:t>
+              <a:t>10/23/2021 8:51 AM</a:t>
             </a:fld>
             <a:endParaRPr lang="en-US" dirty="0"/>
           </a:p>
@@ -1310,7 +1310,7 @@
           <a:p>
             <a:fld id="{D18B56EA-E28F-4F92-9F16-7A6F2501B303}" type="datetime8">
               <a:rPr lang="en-US" smtClean="0"/>
-              <a:t>8/22/2020 2:40 PM</a:t>
+              <a:t>10/23/2021 8:51 AM</a:t>
             </a:fld>
             <a:endParaRPr lang="en-US" dirty="0"/>
           </a:p>
@@ -1491,7 +1491,7 @@
           <a:p>
             <a:fld id="{D18B56EA-E28F-4F92-9F16-7A6F2501B303}" type="datetime8">
               <a:rPr lang="en-US" smtClean="0"/>
-              <a:t>8/22/2020 2:40 PM</a:t>
+              <a:t>10/23/2021 8:51 AM</a:t>
             </a:fld>
             <a:endParaRPr lang="en-US" dirty="0"/>
           </a:p>
@@ -1605,7 +1605,7 @@
                 <a:ea typeface="+mn-ea"/>
                 <a:cs typeface="+mn-cs"/>
               </a:rPr>
-              <a:t>In this unit, you'll learn how to test custom web parts using both local and Office 365 hosted workbench.</a:t>
+              <a:t>In this unit, you'll learn how to test custom web parts using the SharePoint-hosted workbench.</a:t>
             </a:r>
           </a:p>
           <a:p>
@@ -1703,7 +1703,7 @@
           <a:p>
             <a:fld id="{D18B56EA-E28F-4F92-9F16-7A6F2501B303}" type="datetime8">
               <a:rPr lang="en-US" smtClean="0"/>
-              <a:t>8/22/2020 2:40 PM</a:t>
+              <a:t>10/23/2021 8:51 AM</a:t>
             </a:fld>
             <a:endParaRPr lang="en-US" dirty="0"/>
           </a:p>
@@ -1792,11 +1792,8 @@
           <a:p>
             <a:r>
               <a:rPr lang="en-US" dirty="0"/>
-              <a:t>Microsoft provides developers two options to test SharePoint Framework projects. The *workbench* is a special SharePoint page that contains a single canvas that developers can add their web parts to. There are two different workbench options: local &amp; hosted.</a:t>
-            </a:r>
-          </a:p>
-          <a:p>
-            <a:endParaRPr lang="en-US" dirty="0"/>
+              <a:t>Microsoft provides developers page to test SharePoint Framework projects. The workbench is a special SharePoint page that contains a single canvas to which developers can add their web parts.</a:t>
+            </a:r>
           </a:p>
         </p:txBody>
       </p:sp>
@@ -1894,7 +1891,7 @@
           <a:p>
             <a:fld id="{D18B56EA-E28F-4F92-9F16-7A6F2501B303}" type="datetime8">
               <a:rPr lang="en-US" smtClean="0"/>
-              <a:t>8/22/2020 2:40 PM</a:t>
+              <a:t>10/23/2021 8:51 AM</a:t>
             </a:fld>
             <a:endParaRPr lang="en-US" dirty="0"/>
           </a:p>
@@ -1992,7 +1989,7 @@
           <a:p>
             <a:r>
               <a:rPr lang="en-US" dirty="0"/>
-              <a:t>The local workbench is served up by executing the gulp **serve** task. It runs on https://localhost that has no SharePoint context. Its simply an HTML page that loads the SharePoint Framework in the browser.</a:t>
+              <a:t>The local workbench is included with the SharePoint Framework version 1.12.1 and earlier. It runs on https://localhost that has no SharePoint context. It's simply an HTML page that loads the SharePoint Framework in the browser.</a:t>
             </a:r>
           </a:p>
           <a:p>
@@ -2001,7 +1998,7 @@
           <a:p>
             <a:r>
               <a:rPr lang="en-US" dirty="0"/>
-              <a:t>The local workbench is a great option for developers to develop and test web parts that don't require an instance of SharePoint. For web parts that need SharePoint context or work with live SharePoint data, you will need to mock data requests to test your web part in the local workbench.</a:t>
+              <a:t>The local workbench is not included with current versions of the SharePoint Framework, thus it is not covered in the modules in this learning path.</a:t>
             </a:r>
           </a:p>
           <a:p>
@@ -2019,83 +2016,17 @@
           <a:p>
             <a:r>
               <a:rPr lang="en-US" dirty="0"/>
-              <a:t>The SharePoint-hosted workbench is hosted by a real SharePoint site, located at https://{your-</a:t>
-            </a:r>
-            <a:r>
-              <a:rPr lang="en-US" dirty="0" err="1"/>
-              <a:t>sharepoint</a:t>
-            </a:r>
-            <a:r>
-              <a:rPr lang="en-US" dirty="0"/>
-              <a:t>-site}/_layouts/</a:t>
-            </a:r>
-            <a:r>
-              <a:rPr lang="en-US" dirty="0" err="1"/>
-              <a:t>workbench.aspx</a:t>
-            </a:r>
-            <a:r>
-              <a:rPr lang="en-US" dirty="0"/>
-              <a:t>. The hosted workbench is unlike the local workbench in that because it is hosted by a real SharePoint site, it has SharePoint context. This means that your web part can access data in SharePoint lists and libraries in the same site as the hosted workbench.</a:t>
+              <a:t>The SharePoint-hosted workbench is located at **https://{your-sharepoint-site}/_layouts/workbench.aspx**. Because this workbench is hosted by a real SharePoint site, it has SharePoint context. This means that your web part can access data in SharePoint lists and libraries in the same site as the hosted workbench.</a:t>
             </a:r>
           </a:p>
           <a:p>
             <a:endParaRPr lang="en-US" dirty="0"/>
           </a:p>
           <a:p>
-            <a:pPr marL="0" marR="0" lvl="0" indent="0" algn="l" defTabSz="932742" rtl="0" eaLnBrk="1" fontAlgn="auto" latinLnBrk="0" hangingPunct="1">
-              <a:lnSpc>
-                <a:spcPct val="90000"/>
-              </a:lnSpc>
-              <a:spcBef>
-                <a:spcPts val="0"/>
-              </a:spcBef>
-              <a:spcAft>
-                <a:spcPts val="340"/>
-              </a:spcAft>
-              <a:buClrTx/>
-              <a:buSzTx/>
-              <a:buFontTx/>
-              <a:buNone/>
-              <a:tabLst/>
-              <a:defRPr/>
-            </a:pPr>
-            <a:r>
-              <a:rPr lang="en-US" b="0" dirty="0">
-                <a:solidFill>
-                  <a:srgbClr val="000000"/>
-                </a:solidFill>
-                <a:effectLst/>
-                <a:latin typeface="Consolas" panose="020B0609020204030204" pitchFamily="49" charset="0"/>
-              </a:rPr>
-              <a:t>The gulp </a:t>
-            </a:r>
-            <a:r>
-              <a:rPr lang="en-US" b="1" dirty="0">
-                <a:solidFill>
-                  <a:srgbClr val="000080"/>
-                </a:solidFill>
-                <a:effectLst/>
-                <a:latin typeface="Consolas" panose="020B0609020204030204" pitchFamily="49" charset="0"/>
-              </a:rPr>
-              <a:t>**serve**</a:t>
-            </a:r>
-            <a:r>
-              <a:rPr lang="en-US" b="0" dirty="0">
-                <a:solidFill>
-                  <a:srgbClr val="000000"/>
-                </a:solidFill>
-                <a:effectLst/>
-                <a:latin typeface="Consolas" panose="020B0609020204030204" pitchFamily="49" charset="0"/>
-              </a:rPr>
-              <a:t> task will continue to monitor your project and rebuild it when changes are made. However, unlike the local workbench, it won't automatically refresh the browser containing the hosted workbench. To see the changes, you will need to manually refresh the browser where you loaded the hosted workbench.</a:t>
-            </a:r>
-            <a:endParaRPr lang="en-US" dirty="0"/>
-          </a:p>
-          <a:p>
-            <a:endParaRPr lang="en-US" dirty="0"/>
-          </a:p>
-          <a:p>
-            <a:endParaRPr lang="en-US" dirty="0"/>
+            <a:r>
+              <a:rPr lang="en-US" dirty="0"/>
+              <a:t>Even though the gulp **serve** task will monitor your project and rebuild it when changes are made, it won't automatically refresh the browser containing the hosted workbench. To see the changes, you'll need to manually refresh the browser where the workbench is loaded.</a:t>
+            </a:r>
           </a:p>
         </p:txBody>
       </p:sp>
@@ -2193,7 +2124,7 @@
           <a:p>
             <a:fld id="{D18B56EA-E28F-4F92-9F16-7A6F2501B303}" type="datetime8">
               <a:rPr lang="en-US" smtClean="0"/>
-              <a:t>8/22/2020 2:40 PM</a:t>
+              <a:t>10/23/2021 8:51 AM</a:t>
             </a:fld>
             <a:endParaRPr lang="en-US" dirty="0"/>
           </a:p>
@@ -2282,7 +2213,7 @@
           <a:p>
             <a:r>
               <a:rPr lang="en-US" dirty="0"/>
-              <a:t>The gulp **serve** task used to start the local web server monitors your SharePoint Framework project's codebase while you are testing web parts in the local workbench. When a file is changed and saved, the gulp task will rebuild the project and reload the local workbench in the browser, offering immediate feedback of you changes.</a:t>
+              <a:t>The gulp **serve** task used to start the local web server monitors your SharePoint Framework project's codebase while you're testing web parts in the workbench. When a file is changed and saved, the gulp task will rebuild the project.</a:t>
             </a:r>
           </a:p>
           <a:p>
@@ -2300,7 +2231,7 @@
           <a:p>
             <a:r>
               <a:rPr lang="en-US" dirty="0"/>
-              <a:t>Both the local and hosted workbenches require you to start the local web server that will serve each workbench the SharePoint component's manifest and JavaScript bundle. To do this, execute the following command at the command line from the root of your project:</a:t>
+              <a:t>The hosted workbench requires you to start the local web server that will serve the workbench the SharePoint component's manifest and JavaScript bundle. To do this, execute the following command at the command line from the root of your project:</a:t>
             </a:r>
           </a:p>
           <a:p>
@@ -2309,7 +2240,7 @@
           <a:p>
             <a:r>
               <a:rPr lang="en-US" dirty="0"/>
-              <a:t>```shell</a:t>
+              <a:t>```console</a:t>
             </a:r>
           </a:p>
           <a:p>
@@ -2330,7 +2261,15 @@
           <a:p>
             <a:r>
               <a:rPr lang="en-US" dirty="0"/>
-              <a:t>This command will run the **build** and **bundle** tasks, start the local web server, launch the default browser, and load the workbench page. If you don't want it to launch the browser automatically, include the `--</a:t>
+              <a:t>This command will run the **build** and **bundle** tasks, start the local web server, launch the default browser, and load the workbench page at the URL configured in **</a:t>
+            </a:r>
+            <a:r>
+              <a:rPr lang="en-US" dirty="0" err="1"/>
+              <a:t>serve.json</a:t>
+            </a:r>
+            <a:r>
+              <a:rPr lang="en-US" dirty="0"/>
+              <a:t>**. If you don't want it to launch the browser automatically, include the **--</a:t>
             </a:r>
             <a:r>
               <a:rPr lang="en-US" dirty="0" err="1"/>
@@ -2338,7 +2277,7 @@
             </a:r>
             <a:r>
               <a:rPr lang="en-US" dirty="0"/>
-              <a:t>` switch:</a:t>
+              <a:t>** switch:</a:t>
             </a:r>
           </a:p>
           <a:p>
@@ -2347,7 +2286,7 @@
           <a:p>
             <a:r>
               <a:rPr lang="en-US" dirty="0"/>
-              <a:t>```shell</a:t>
+              <a:t>```console</a:t>
             </a:r>
           </a:p>
           <a:p>
@@ -2463,7 +2402,7 @@
           <a:p>
             <a:fld id="{D18B56EA-E28F-4F92-9F16-7A6F2501B303}" type="datetime8">
               <a:rPr lang="en-US" smtClean="0"/>
-              <a:t>8/22/2020 2:40 PM</a:t>
+              <a:t>10/23/2021 8:51 AM</a:t>
             </a:fld>
             <a:endParaRPr lang="en-US" dirty="0"/>
           </a:p>
@@ -2679,7 +2618,7 @@
           <a:p>
             <a:fld id="{D18B56EA-E28F-4F92-9F16-7A6F2501B303}" type="datetime8">
               <a:rPr lang="en-US" smtClean="0"/>
-              <a:t>8/22/2020 2:40 PM</a:t>
+              <a:t>10/23/2021 8:51 AM</a:t>
             </a:fld>
             <a:endParaRPr lang="en-US" dirty="0"/>
           </a:p>
@@ -2766,55 +2705,6 @@
           <a:bodyPr/>
           <a:lstStyle/>
           <a:p>
-            <a:r>
-              <a:rPr lang="en-US" sz="900" b="0" kern="1200" dirty="0">
-                <a:solidFill>
-                  <a:schemeClr val="tx1"/>
-                </a:solidFill>
-                <a:effectLst/>
-                <a:latin typeface="Segoe UI Light" pitchFamily="34" charset="0"/>
-                <a:ea typeface="+mn-ea"/>
-                <a:cs typeface="+mn-cs"/>
-              </a:rPr>
-              <a:t>SharePoint Framework web parts can run on both classic and modern pages. To test a web part on a classic page, you first put the page into edit mode and add the web part using the </a:t>
-            </a:r>
-            <a:r>
-              <a:rPr lang="en-US" sz="900" b="1" kern="1200" dirty="0">
-                <a:solidFill>
-                  <a:schemeClr val="tx1"/>
-                </a:solidFill>
-                <a:effectLst/>
-                <a:latin typeface="Segoe UI Light" pitchFamily="34" charset="0"/>
-                <a:ea typeface="+mn-ea"/>
-                <a:cs typeface="+mn-cs"/>
-              </a:rPr>
-              <a:t>**Insert**</a:t>
-            </a:r>
-            <a:r>
-              <a:rPr lang="en-US" sz="900" b="0" kern="1200" dirty="0">
-                <a:solidFill>
-                  <a:schemeClr val="tx1"/>
-                </a:solidFill>
-                <a:effectLst/>
-                <a:latin typeface="Segoe UI Light" pitchFamily="34" charset="0"/>
-                <a:ea typeface="+mn-ea"/>
-                <a:cs typeface="+mn-cs"/>
-              </a:rPr>
-              <a:t> tab in the ribbon, the same way you add server-side web parts.</a:t>
-            </a:r>
-          </a:p>
-          <a:p>
-            <a:endParaRPr lang="en-US" sz="900" b="0" kern="1200" dirty="0">
-              <a:solidFill>
-                <a:schemeClr val="tx1"/>
-              </a:solidFill>
-              <a:effectLst/>
-              <a:latin typeface="Segoe UI Light" pitchFamily="34" charset="0"/>
-              <a:ea typeface="+mn-ea"/>
-              <a:cs typeface="+mn-cs"/>
-            </a:endParaRPr>
-          </a:p>
-          <a:p>
             <a:pPr marL="0" marR="0" lvl="0" indent="0" algn="l" defTabSz="932742" rtl="0" eaLnBrk="1" fontAlgn="auto" latinLnBrk="0" hangingPunct="1">
               <a:lnSpc>
                 <a:spcPct val="90000"/>
@@ -2842,19 +2732,8 @@
                 <a:ea typeface="+mn-ea"/>
                 <a:cs typeface="+mn-cs"/>
               </a:rPr>
-              <a:t>Select the web part from the tool box to add it to the page.</a:t>
-            </a:r>
-          </a:p>
-          <a:p>
-            <a:endParaRPr lang="en-US" sz="900" b="0" kern="1200" dirty="0">
-              <a:solidFill>
-                <a:schemeClr val="tx1"/>
-              </a:solidFill>
-              <a:effectLst/>
-              <a:latin typeface="Segoe UI Light" pitchFamily="34" charset="0"/>
-              <a:ea typeface="+mn-ea"/>
-              <a:cs typeface="+mn-cs"/>
-            </a:endParaRPr>
+              <a:t>SharePoint Framework web parts can run on both classic and modern pages. To test a web part on a classic page, you first put the page into edit mode and add the web part using the **Insert** tab in the ribbon, the same way you add server-side web parts.</a:t>
+            </a:r>
           </a:p>
           <a:p>
             <a:pPr marL="0" marR="0" lvl="0" indent="0" algn="l" defTabSz="932742" rtl="0" eaLnBrk="1" fontAlgn="auto" latinLnBrk="0" hangingPunct="1">
@@ -2874,42 +2753,15 @@
               <a:tabLst/>
               <a:defRPr/>
             </a:pPr>
-            <a:r>
-              <a:rPr lang="en-US" sz="900" b="0" kern="1200" dirty="0">
-                <a:solidFill>
-                  <a:schemeClr val="tx1"/>
-                </a:solidFill>
-                <a:effectLst/>
-                <a:latin typeface="Segoe UI Light" pitchFamily="34" charset="0"/>
-                <a:ea typeface="+mn-ea"/>
-                <a:cs typeface="+mn-cs"/>
-              </a:rPr>
-              <a:t>To edit the web part's properties, you must select the web part and then select </a:t>
-            </a:r>
-            <a:r>
-              <a:rPr lang="en-US" sz="900" b="1" kern="1200" dirty="0">
-                <a:solidFill>
-                  <a:schemeClr val="tx1"/>
-                </a:solidFill>
-                <a:effectLst/>
-                <a:latin typeface="Segoe UI Light" pitchFamily="34" charset="0"/>
-                <a:ea typeface="+mn-ea"/>
-                <a:cs typeface="+mn-cs"/>
-              </a:rPr>
-              <a:t>**Edit web part**</a:t>
-            </a:r>
-            <a:r>
-              <a:rPr lang="en-US" sz="900" b="0" kern="1200" dirty="0">
-                <a:solidFill>
-                  <a:schemeClr val="tx1"/>
-                </a:solidFill>
-                <a:effectLst/>
-                <a:latin typeface="Segoe UI Light" pitchFamily="34" charset="0"/>
-                <a:ea typeface="+mn-ea"/>
-                <a:cs typeface="+mn-cs"/>
-              </a:rPr>
-              <a:t> from the ribbon while the page is in edit mode. This means that while a classic page can be in edit mode, the web part can be in either presentation or edit mode.</a:t>
-            </a:r>
+            <a:endParaRPr lang="en-US" sz="900" b="0" kern="1200" dirty="0">
+              <a:solidFill>
+                <a:schemeClr val="tx1"/>
+              </a:solidFill>
+              <a:effectLst/>
+              <a:latin typeface="Segoe UI Light" pitchFamily="34" charset="0"/>
+              <a:ea typeface="+mn-ea"/>
+              <a:cs typeface="+mn-cs"/>
+            </a:endParaRPr>
           </a:p>
           <a:p>
             <a:pPr marL="0" marR="0" lvl="0" indent="0" algn="l" defTabSz="932742" rtl="0" eaLnBrk="1" fontAlgn="auto" latinLnBrk="0" hangingPunct="1">
@@ -2929,6 +2781,37 @@
               <a:tabLst/>
               <a:defRPr/>
             </a:pPr>
+            <a:r>
+              <a:rPr lang="en-US" sz="900" b="0" kern="1200" dirty="0">
+                <a:solidFill>
+                  <a:schemeClr val="tx1"/>
+                </a:solidFill>
+                <a:effectLst/>
+                <a:latin typeface="Segoe UI Light" pitchFamily="34" charset="0"/>
+                <a:ea typeface="+mn-ea"/>
+                <a:cs typeface="+mn-cs"/>
+              </a:rPr>
+              <a:t>Select the web part from the gallery to add it to the page.</a:t>
+            </a:r>
+          </a:p>
+          <a:p>
+            <a:pPr marL="0" marR="0" lvl="0" indent="0" algn="l" defTabSz="932742" rtl="0" eaLnBrk="1" fontAlgn="auto" latinLnBrk="0" hangingPunct="1">
+              <a:lnSpc>
+                <a:spcPct val="90000"/>
+              </a:lnSpc>
+              <a:spcBef>
+                <a:spcPts val="0"/>
+              </a:spcBef>
+              <a:spcAft>
+                <a:spcPts val="340"/>
+              </a:spcAft>
+              <a:buClrTx/>
+              <a:buSzTx/>
+              <a:buFontTx/>
+              <a:buNone/>
+              <a:tabLst/>
+              <a:defRPr/>
+            </a:pPr>
             <a:endParaRPr lang="en-US" sz="900" b="0" kern="1200" dirty="0">
               <a:solidFill>
                 <a:schemeClr val="tx1"/>
@@ -2938,6 +2821,37 @@
               <a:ea typeface="+mn-ea"/>
               <a:cs typeface="+mn-cs"/>
             </a:endParaRPr>
+          </a:p>
+          <a:p>
+            <a:pPr marL="0" marR="0" lvl="0" indent="0" algn="l" defTabSz="932742" rtl="0" eaLnBrk="1" fontAlgn="auto" latinLnBrk="0" hangingPunct="1">
+              <a:lnSpc>
+                <a:spcPct val="90000"/>
+              </a:lnSpc>
+              <a:spcBef>
+                <a:spcPts val="0"/>
+              </a:spcBef>
+              <a:spcAft>
+                <a:spcPts val="340"/>
+              </a:spcAft>
+              <a:buClrTx/>
+              <a:buSzTx/>
+              <a:buFontTx/>
+              <a:buNone/>
+              <a:tabLst/>
+              <a:defRPr/>
+            </a:pPr>
+            <a:r>
+              <a:rPr lang="en-US" sz="900" b="0" kern="1200" dirty="0">
+                <a:solidFill>
+                  <a:schemeClr val="tx1"/>
+                </a:solidFill>
+                <a:effectLst/>
+                <a:latin typeface="Segoe UI Light" pitchFamily="34" charset="0"/>
+                <a:ea typeface="+mn-ea"/>
+                <a:cs typeface="+mn-cs"/>
+              </a:rPr>
+              <a:t>To edit the web part's properties, you must select the web part and then select **Edit web part** from the web part's context menu while the page is in edit mode. This means that while a classic page can be in edit mode, the web part can be in either presentation or edit mode.</a:t>
+            </a:r>
           </a:p>
         </p:txBody>
       </p:sp>
@@ -3035,7 +2949,7 @@
           <a:p>
             <a:fld id="{D18B56EA-E28F-4F92-9F16-7A6F2501B303}" type="datetime8">
               <a:rPr lang="en-US" smtClean="0"/>
-              <a:t>8/22/2020 2:40 PM</a:t>
+              <a:t>10/23/2021 8:51 AM</a:t>
             </a:fld>
             <a:endParaRPr lang="en-US" dirty="0"/>
           </a:p>
@@ -3133,7 +3047,7 @@
           <a:p>
             <a:r>
               <a:rPr lang="en-US" dirty="0"/>
-              <a:t>Similar to the classic experience, create a new page or edit an existing one. Modern pages have a horizontal line with a **+** image that you use to open the web part toolbox.</a:t>
+              <a:t>Similar to the classic experience, create a new page or edit an existing one. Modern pages have a horizontal line with a + image that you use to open the web part toolbox.</a:t>
             </a:r>
           </a:p>
           <a:p>
@@ -3142,7 +3056,7 @@
           <a:p>
             <a:r>
               <a:rPr lang="en-US" dirty="0"/>
-              <a:t>To open the web part's property pane, select the **pencil** edit icon to the left of the web part when you hover the mouse of the web part.</a:t>
+              <a:t>To open the web part's property pane, select the pencil edit icon to the left of the web part when you hover the mouse of the web part.</a:t>
             </a:r>
           </a:p>
           <a:p>
@@ -3250,7 +3164,7 @@
           <a:p>
             <a:fld id="{D18B56EA-E28F-4F92-9F16-7A6F2501B303}" type="datetime8">
               <a:rPr lang="en-US" smtClean="0"/>
-              <a:t>8/22/2020 2:40 PM</a:t>
+              <a:t>10/23/2021 8:51 AM</a:t>
             </a:fld>
             <a:endParaRPr lang="en-US" dirty="0"/>
           </a:p>
@@ -3431,7 +3345,7 @@
           <a:p>
             <a:fld id="{D18B56EA-E28F-4F92-9F16-7A6F2501B303}" type="datetime8">
               <a:rPr lang="en-US" smtClean="0"/>
-              <a:t>8/22/2020 2:40 PM</a:t>
+              <a:t>10/23/2021 8:51 AM</a:t>
             </a:fld>
             <a:endParaRPr lang="en-US" dirty="0"/>
           </a:p>
@@ -16185,7 +16099,7 @@
           <a:p>
             <a:r>
               <a:rPr lang="en-US" dirty="0"/>
-              <a:t>Testing the Web Part in the Local &amp; Hosted Workbench</a:t>
+              <a:t>Testing the Web Part in the SharePoint-hosted Workbench</a:t>
             </a:r>
           </a:p>
         </p:txBody>
@@ -17410,7 +17324,12 @@
             <p:ph type="body" sz="quarter" idx="10"/>
           </p:nvPr>
         </p:nvSpPr>
-        <p:spPr/>
+        <p:spPr>
+          <a:xfrm>
+            <a:off x="464400" y="1212850"/>
+            <a:ext cx="11574000" cy="1010397"/>
+          </a:xfrm>
+        </p:spPr>
         <p:txBody>
           <a:bodyPr/>
           <a:lstStyle/>
@@ -17423,7 +17342,7 @@
           <a:p>
             <a:r>
               <a:rPr lang="en-US" dirty="0"/>
-              <a:t>Test your changes immediately even in offline mode</a:t>
+              <a:t>Test your changes immediately</a:t>
             </a:r>
           </a:p>
           <a:p>
@@ -17456,10 +17375,10 @@
       </p:sp>
       <p:pic>
         <p:nvPicPr>
-          <p:cNvPr id="3" name="Picture 2">
+          <p:cNvPr id="5" name="Picture 4">
             <a:extLst>
               <a:ext uri="{FF2B5EF4-FFF2-40B4-BE49-F238E27FC236}">
-                <a16:creationId xmlns:a16="http://schemas.microsoft.com/office/drawing/2014/main" id="{822C3F65-A49A-4BB8-9498-046E4AC68AAF}"/>
+                <a16:creationId xmlns:a16="http://schemas.microsoft.com/office/drawing/2014/main" id="{1D38D5CB-2EB9-4976-93D2-7DDC6439ED0F}"/>
               </a:ext>
             </a:extLst>
           </p:cNvPr>
@@ -17476,8 +17395,8 @@
         </p:blipFill>
         <p:spPr>
           <a:xfrm>
-            <a:off x="2232631" y="2459067"/>
-            <a:ext cx="7971211" cy="3322608"/>
+            <a:off x="2594613" y="2367699"/>
+            <a:ext cx="7247248" cy="3993226"/>
           </a:xfrm>
           <a:prstGeom prst="rect">
             <a:avLst/>
@@ -17536,7 +17455,12 @@
             <p:ph type="body" sz="quarter" idx="10"/>
           </p:nvPr>
         </p:nvSpPr>
-        <p:spPr/>
+        <p:spPr>
+          <a:xfrm>
+            <a:off x="464400" y="1212850"/>
+            <a:ext cx="11574000" cy="4748992"/>
+          </a:xfrm>
+        </p:spPr>
         <p:txBody>
           <a:bodyPr/>
           <a:lstStyle/>
@@ -17544,6 +17468,13 @@
             <a:r>
               <a:rPr lang="en-US" dirty="0"/>
               <a:t>Local</a:t>
+            </a:r>
+          </a:p>
+          <a:p>
+            <a:pPr lvl="1"/>
+            <a:r>
+              <a:rPr lang="en-US" dirty="0"/>
+              <a:t>Included with the SharePoint Framework version 1.12.1 and earlier</a:t>
             </a:r>
           </a:p>
           <a:p>
@@ -17580,7 +17511,7 @@
           <a:p>
             <a:r>
               <a:rPr lang="en-US" dirty="0"/>
-              <a:t>SharePoint (Hosted)</a:t>
+              <a:t>SharePoint-hosted</a:t>
             </a:r>
           </a:p>
           <a:p>
@@ -17696,7 +17627,7 @@
         <p:spPr>
           <a:xfrm>
             <a:off x="274638" y="1212850"/>
-            <a:ext cx="11887200" cy="3323987"/>
+            <a:ext cx="11887200" cy="2068259"/>
           </a:xfrm>
         </p:spPr>
         <p:txBody>
@@ -17704,27 +17635,27 @@
           <a:lstStyle/>
           <a:p>
             <a:r>
-              <a:rPr lang="en-US"/>
-              <a:t>Build and run on local server </a:t>
-            </a:r>
-            <a:r>
-              <a:rPr lang="en-US" b="1"/>
+              <a:rPr lang="en-US" dirty="0"/>
+              <a:t>Build and run solution on local server </a:t>
+            </a:r>
+            <a:r>
+              <a:rPr lang="en-US" b="1" dirty="0"/>
               <a:t>and </a:t>
             </a:r>
             <a:r>
-              <a:rPr lang="en-US"/>
-              <a:t>automatically launch local SharePoint Workbench</a:t>
-            </a:r>
-          </a:p>
-          <a:p>
-            <a:endParaRPr lang="en-US"/>
-          </a:p>
-          <a:p>
-            <a:endParaRPr lang="en-US"/>
-          </a:p>
-          <a:p>
-            <a:r>
-              <a:rPr lang="en-US"/>
+              <a:rPr lang="en-US" dirty="0"/>
+              <a:t>automatically launch the SharePoint Workbench</a:t>
+            </a:r>
+          </a:p>
+          <a:p>
+            <a:endParaRPr lang="en-US" dirty="0"/>
+          </a:p>
+          <a:p>
+            <a:endParaRPr lang="en-US" dirty="0"/>
+          </a:p>
+          <a:p>
+            <a:r>
+              <a:rPr lang="en-US" dirty="0"/>
               <a:t>Build and run solution on local server</a:t>
             </a:r>
           </a:p>
@@ -18308,34 +18239,12 @@
           <a:chExt cx="0" cy="0"/>
         </a:xfrm>
       </p:grpSpPr>
-      <p:sp>
-        <p:nvSpPr>
-          <p:cNvPr id="3" name="Title 2"/>
-          <p:cNvSpPr>
-            <a:spLocks noGrp="1"/>
-          </p:cNvSpPr>
-          <p:nvPr>
-            <p:ph type="title"/>
-          </p:nvPr>
-        </p:nvSpPr>
-        <p:spPr/>
-        <p:txBody>
-          <a:bodyPr/>
-          <a:lstStyle/>
-          <a:p>
-            <a:r>
-              <a:rPr lang="en-US" dirty="0"/>
-              <a:t>Classic Page</a:t>
-            </a:r>
-          </a:p>
-        </p:txBody>
-      </p:sp>
       <p:pic>
         <p:nvPicPr>
-          <p:cNvPr id="5" name="Picture 4">
+          <p:cNvPr id="16" name="Picture 15" descr="Graphical user interface, application&#10;&#10;Description automatically generated">
             <a:extLst>
               <a:ext uri="{FF2B5EF4-FFF2-40B4-BE49-F238E27FC236}">
-                <a16:creationId xmlns:a16="http://schemas.microsoft.com/office/drawing/2014/main" id="{6C201550-2142-4B0F-9E36-3AD6DAAC178C}"/>
+                <a16:creationId xmlns:a16="http://schemas.microsoft.com/office/drawing/2014/main" id="{46776CE9-62C7-4D79-B8B2-FD0FA4931EDB}"/>
               </a:ext>
             </a:extLst>
           </p:cNvPr>
@@ -18352,28 +18261,20 @@
         </p:blipFill>
         <p:spPr>
           <a:xfrm>
-            <a:off x="465138" y="1362324"/>
-            <a:ext cx="3094477" cy="1685676"/>
+            <a:off x="4042849" y="1361000"/>
+            <a:ext cx="7646574" cy="4272523"/>
           </a:xfrm>
           <a:prstGeom prst="rect">
             <a:avLst/>
           </a:prstGeom>
-          <a:ln>
-            <a:solidFill>
-              <a:schemeClr val="tx1">
-                <a:lumMod val="25000"/>
-                <a:lumOff val="75000"/>
-              </a:schemeClr>
-            </a:solidFill>
-          </a:ln>
         </p:spPr>
       </p:pic>
       <p:pic>
         <p:nvPicPr>
-          <p:cNvPr id="8" name="Picture 7">
+          <p:cNvPr id="10" name="Picture 9" descr="Graphical user interface, application&#10;&#10;Description automatically generated">
             <a:extLst>
               <a:ext uri="{FF2B5EF4-FFF2-40B4-BE49-F238E27FC236}">
-                <a16:creationId xmlns:a16="http://schemas.microsoft.com/office/drawing/2014/main" id="{F399B1FB-A1D9-4F5D-9824-009188C5BFF1}"/>
+                <a16:creationId xmlns:a16="http://schemas.microsoft.com/office/drawing/2014/main" id="{3FBC7ED8-0F62-440A-8F8A-8701FA038E8D}"/>
               </a:ext>
             </a:extLst>
           </p:cNvPr>
@@ -18390,28 +18291,42 @@
         </p:blipFill>
         <p:spPr>
           <a:xfrm>
-            <a:off x="465138" y="3497262"/>
-            <a:ext cx="3010161" cy="2804403"/>
+            <a:off x="465138" y="3481512"/>
+            <a:ext cx="3223539" cy="2941575"/>
           </a:xfrm>
           <a:prstGeom prst="rect">
             <a:avLst/>
           </a:prstGeom>
-          <a:ln>
-            <a:solidFill>
-              <a:schemeClr val="tx1">
-                <a:lumMod val="25000"/>
-                <a:lumOff val="75000"/>
-              </a:schemeClr>
-            </a:solidFill>
-          </a:ln>
         </p:spPr>
       </p:pic>
+      <p:sp>
+        <p:nvSpPr>
+          <p:cNvPr id="3" name="Title 2"/>
+          <p:cNvSpPr>
+            <a:spLocks noGrp="1"/>
+          </p:cNvSpPr>
+          <p:nvPr>
+            <p:ph type="title"/>
+          </p:nvPr>
+        </p:nvSpPr>
+        <p:spPr/>
+        <p:txBody>
+          <a:bodyPr/>
+          <a:lstStyle/>
+          <a:p>
+            <a:r>
+              <a:rPr lang="en-US" dirty="0"/>
+              <a:t>Classic Page</a:t>
+            </a:r>
+          </a:p>
+        </p:txBody>
+      </p:sp>
       <p:pic>
         <p:nvPicPr>
-          <p:cNvPr id="11" name="Picture 10">
+          <p:cNvPr id="7" name="Picture 6" descr="Graphical user interface, application&#10;&#10;Description automatically generated">
             <a:extLst>
               <a:ext uri="{FF2B5EF4-FFF2-40B4-BE49-F238E27FC236}">
-                <a16:creationId xmlns:a16="http://schemas.microsoft.com/office/drawing/2014/main" id="{6DC32E5A-E5B9-407C-B394-F08EBCEFFE6E}"/>
+                <a16:creationId xmlns:a16="http://schemas.microsoft.com/office/drawing/2014/main" id="{06DB7A9E-7862-405D-B526-A92C23451EA2}"/>
               </a:ext>
             </a:extLst>
           </p:cNvPr>
@@ -18428,277 +18343,14 @@
         </p:blipFill>
         <p:spPr>
           <a:xfrm>
-            <a:off x="3971131" y="1362324"/>
-            <a:ext cx="7801070" cy="4238376"/>
+            <a:off x="465138" y="1359678"/>
+            <a:ext cx="2735817" cy="1806097"/>
           </a:xfrm>
           <a:prstGeom prst="rect">
             <a:avLst/>
           </a:prstGeom>
-          <a:ln>
-            <a:solidFill>
-              <a:schemeClr val="tx1">
-                <a:lumMod val="25000"/>
-                <a:lumOff val="75000"/>
-              </a:schemeClr>
-            </a:solidFill>
-          </a:ln>
         </p:spPr>
       </p:pic>
-      <p:sp>
-        <p:nvSpPr>
-          <p:cNvPr id="12" name="Flowchart: Connector 11">
-            <a:extLst>
-              <a:ext uri="{FF2B5EF4-FFF2-40B4-BE49-F238E27FC236}">
-                <a16:creationId xmlns:a16="http://schemas.microsoft.com/office/drawing/2014/main" id="{6E4161DC-A132-47DC-B2CF-E320C8D97F88}"/>
-              </a:ext>
-            </a:extLst>
-          </p:cNvPr>
-          <p:cNvSpPr/>
-          <p:nvPr/>
-        </p:nvSpPr>
-        <p:spPr bwMode="auto">
-          <a:xfrm>
-            <a:off x="3000815" y="2606227"/>
-            <a:ext cx="558800" cy="474538"/>
-          </a:xfrm>
-          <a:prstGeom prst="flowChartConnector">
-            <a:avLst/>
-          </a:prstGeom>
-          <a:solidFill>
-            <a:schemeClr val="accent1"/>
-          </a:solidFill>
-          <a:ln>
-            <a:noFill/>
-            <a:headEnd type="none" w="med" len="med"/>
-            <a:tailEnd type="none" w="med" len="med"/>
-          </a:ln>
-          <a:effectLst/>
-        </p:spPr>
-        <p:style>
-          <a:lnRef idx="1">
-            <a:schemeClr val="accent2"/>
-          </a:lnRef>
-          <a:fillRef idx="3">
-            <a:schemeClr val="accent2"/>
-          </a:fillRef>
-          <a:effectRef idx="2">
-            <a:schemeClr val="accent2"/>
-          </a:effectRef>
-          <a:fontRef idx="minor">
-            <a:schemeClr val="lt1"/>
-          </a:fontRef>
-        </p:style>
-        <p:txBody>
-          <a:bodyPr rot="0" spcFirstLastPara="0" vertOverflow="overflow" horzOverflow="overflow" vert="horz" wrap="square" lIns="182880" tIns="146304" rIns="182880" bIns="146304" numCol="1" spcCol="0" rtlCol="0" fromWordArt="0" anchor="ctr" anchorCtr="0" forceAA="0" compatLnSpc="1">
-            <a:prstTxWarp prst="textNoShape">
-              <a:avLst/>
-            </a:prstTxWarp>
-            <a:noAutofit/>
-          </a:bodyPr>
-          <a:lstStyle/>
-          <a:p>
-            <a:pPr algn="ctr" defTabSz="932472" fontAlgn="base">
-              <a:lnSpc>
-                <a:spcPct val="90000"/>
-              </a:lnSpc>
-              <a:spcBef>
-                <a:spcPct val="0"/>
-              </a:spcBef>
-              <a:spcAft>
-                <a:spcPct val="0"/>
-              </a:spcAft>
-            </a:pPr>
-            <a:r>
-              <a:rPr lang="en-US" sz="2400" dirty="0">
-                <a:gradFill>
-                  <a:gsLst>
-                    <a:gs pos="0">
-                      <a:srgbClr val="FFFFFF"/>
-                    </a:gs>
-                    <a:gs pos="100000">
-                      <a:srgbClr val="FFFFFF"/>
-                    </a:gs>
-                  </a:gsLst>
-                  <a:lin ang="5400000" scaled="0"/>
-                </a:gradFill>
-                <a:ea typeface="Segoe UI" pitchFamily="34" charset="0"/>
-                <a:cs typeface="Segoe UI" pitchFamily="34" charset="0"/>
-              </a:rPr>
-              <a:t>1</a:t>
-            </a:r>
-          </a:p>
-        </p:txBody>
-      </p:sp>
-      <p:sp>
-        <p:nvSpPr>
-          <p:cNvPr id="13" name="Flowchart: Connector 12">
-            <a:extLst>
-              <a:ext uri="{FF2B5EF4-FFF2-40B4-BE49-F238E27FC236}">
-                <a16:creationId xmlns:a16="http://schemas.microsoft.com/office/drawing/2014/main" id="{8B5936EC-C24A-4FD0-9B93-CDE2C3435861}"/>
-              </a:ext>
-            </a:extLst>
-          </p:cNvPr>
-          <p:cNvSpPr/>
-          <p:nvPr/>
-        </p:nvSpPr>
-        <p:spPr bwMode="auto">
-          <a:xfrm>
-            <a:off x="2916499" y="5817154"/>
-            <a:ext cx="558800" cy="474538"/>
-          </a:xfrm>
-          <a:prstGeom prst="flowChartConnector">
-            <a:avLst/>
-          </a:prstGeom>
-          <a:solidFill>
-            <a:schemeClr val="accent1"/>
-          </a:solidFill>
-          <a:ln>
-            <a:noFill/>
-            <a:headEnd type="none" w="med" len="med"/>
-            <a:tailEnd type="none" w="med" len="med"/>
-          </a:ln>
-          <a:effectLst/>
-        </p:spPr>
-        <p:style>
-          <a:lnRef idx="1">
-            <a:schemeClr val="accent2"/>
-          </a:lnRef>
-          <a:fillRef idx="3">
-            <a:schemeClr val="accent2"/>
-          </a:fillRef>
-          <a:effectRef idx="2">
-            <a:schemeClr val="accent2"/>
-          </a:effectRef>
-          <a:fontRef idx="minor">
-            <a:schemeClr val="lt1"/>
-          </a:fontRef>
-        </p:style>
-        <p:txBody>
-          <a:bodyPr rot="0" spcFirstLastPara="0" vertOverflow="overflow" horzOverflow="overflow" vert="horz" wrap="square" lIns="182880" tIns="146304" rIns="182880" bIns="146304" numCol="1" spcCol="0" rtlCol="0" fromWordArt="0" anchor="ctr" anchorCtr="0" forceAA="0" compatLnSpc="1">
-            <a:prstTxWarp prst="textNoShape">
-              <a:avLst/>
-            </a:prstTxWarp>
-            <a:noAutofit/>
-          </a:bodyPr>
-          <a:lstStyle/>
-          <a:p>
-            <a:pPr algn="ctr" defTabSz="932472" fontAlgn="base">
-              <a:lnSpc>
-                <a:spcPct val="90000"/>
-              </a:lnSpc>
-              <a:spcBef>
-                <a:spcPct val="0"/>
-              </a:spcBef>
-              <a:spcAft>
-                <a:spcPct val="0"/>
-              </a:spcAft>
-            </a:pPr>
-            <a:r>
-              <a:rPr lang="en-US" sz="2400" dirty="0">
-                <a:gradFill>
-                  <a:gsLst>
-                    <a:gs pos="0">
-                      <a:srgbClr val="FFFFFF"/>
-                    </a:gs>
-                    <a:gs pos="100000">
-                      <a:srgbClr val="FFFFFF"/>
-                    </a:gs>
-                  </a:gsLst>
-                  <a:lin ang="5400000" scaled="0"/>
-                </a:gradFill>
-                <a:ea typeface="Segoe UI" pitchFamily="34" charset="0"/>
-                <a:cs typeface="Segoe UI" pitchFamily="34" charset="0"/>
-              </a:rPr>
-              <a:t>2</a:t>
-            </a:r>
-          </a:p>
-        </p:txBody>
-      </p:sp>
-      <p:sp>
-        <p:nvSpPr>
-          <p:cNvPr id="14" name="Flowchart: Connector 13">
-            <a:extLst>
-              <a:ext uri="{FF2B5EF4-FFF2-40B4-BE49-F238E27FC236}">
-                <a16:creationId xmlns:a16="http://schemas.microsoft.com/office/drawing/2014/main" id="{66AB1EC5-B2F1-4484-B13D-33F94927B3C1}"/>
-              </a:ext>
-            </a:extLst>
-          </p:cNvPr>
-          <p:cNvSpPr/>
-          <p:nvPr/>
-        </p:nvSpPr>
-        <p:spPr bwMode="auto">
-          <a:xfrm>
-            <a:off x="11213401" y="5113462"/>
-            <a:ext cx="558800" cy="474538"/>
-          </a:xfrm>
-          <a:prstGeom prst="flowChartConnector">
-            <a:avLst/>
-          </a:prstGeom>
-          <a:solidFill>
-            <a:schemeClr val="accent1"/>
-          </a:solidFill>
-          <a:ln>
-            <a:noFill/>
-            <a:headEnd type="none" w="med" len="med"/>
-            <a:tailEnd type="none" w="med" len="med"/>
-          </a:ln>
-          <a:effectLst/>
-        </p:spPr>
-        <p:style>
-          <a:lnRef idx="1">
-            <a:schemeClr val="accent2"/>
-          </a:lnRef>
-          <a:fillRef idx="3">
-            <a:schemeClr val="accent2"/>
-          </a:fillRef>
-          <a:effectRef idx="2">
-            <a:schemeClr val="accent2"/>
-          </a:effectRef>
-          <a:fontRef idx="minor">
-            <a:schemeClr val="lt1"/>
-          </a:fontRef>
-        </p:style>
-        <p:txBody>
-          <a:bodyPr rot="0" spcFirstLastPara="0" vertOverflow="overflow" horzOverflow="overflow" vert="horz" wrap="square" lIns="182880" tIns="146304" rIns="182880" bIns="146304" numCol="1" spcCol="0" rtlCol="0" fromWordArt="0" anchor="ctr" anchorCtr="0" forceAA="0" compatLnSpc="1">
-            <a:prstTxWarp prst="textNoShape">
-              <a:avLst/>
-            </a:prstTxWarp>
-            <a:noAutofit/>
-          </a:bodyPr>
-          <a:lstStyle/>
-          <a:p>
-            <a:pPr algn="ctr" defTabSz="932472" fontAlgn="base">
-              <a:lnSpc>
-                <a:spcPct val="90000"/>
-              </a:lnSpc>
-              <a:spcBef>
-                <a:spcPct val="0"/>
-              </a:spcBef>
-              <a:spcAft>
-                <a:spcPct val="0"/>
-              </a:spcAft>
-            </a:pPr>
-            <a:r>
-              <a:rPr lang="en-US" sz="2400" dirty="0">
-                <a:gradFill>
-                  <a:gsLst>
-                    <a:gs pos="0">
-                      <a:srgbClr val="FFFFFF"/>
-                    </a:gs>
-                    <a:gs pos="100000">
-                      <a:srgbClr val="FFFFFF"/>
-                    </a:gs>
-                  </a:gsLst>
-                  <a:lin ang="5400000" scaled="0"/>
-                </a:gradFill>
-                <a:ea typeface="Segoe UI" pitchFamily="34" charset="0"/>
-                <a:cs typeface="Segoe UI" pitchFamily="34" charset="0"/>
-              </a:rPr>
-              <a:t>3</a:t>
-            </a:r>
-          </a:p>
-        </p:txBody>
-      </p:sp>
     </p:spTree>
     <p:extLst>
       <p:ext uri="{BB962C8B-B14F-4D97-AF65-F5344CB8AC3E}">
@@ -18756,10 +18408,10 @@
       </p:sp>
       <p:pic>
         <p:nvPicPr>
-          <p:cNvPr id="5" name="Picture 4">
+          <p:cNvPr id="4" name="Picture 3" descr="Graphical user interface, application&#10;&#10;Description automatically generated">
             <a:extLst>
               <a:ext uri="{FF2B5EF4-FFF2-40B4-BE49-F238E27FC236}">
-                <a16:creationId xmlns:a16="http://schemas.microsoft.com/office/drawing/2014/main" id="{4CCD12F8-0BD3-4079-922E-1F1CC2A8445F}"/>
+                <a16:creationId xmlns:a16="http://schemas.microsoft.com/office/drawing/2014/main" id="{83EC7221-EAED-4115-A522-F50BBDACB1CC}"/>
               </a:ext>
             </a:extLst>
           </p:cNvPr>
@@ -18776,28 +18428,20 @@
         </p:blipFill>
         <p:spPr>
           <a:xfrm>
-            <a:off x="136130" y="1409299"/>
-            <a:ext cx="2035570" cy="2166615"/>
+            <a:off x="465138" y="1420632"/>
+            <a:ext cx="2735817" cy="1806097"/>
           </a:xfrm>
           <a:prstGeom prst="rect">
             <a:avLst/>
           </a:prstGeom>
-          <a:ln>
-            <a:solidFill>
-              <a:schemeClr val="tx1">
-                <a:lumMod val="25000"/>
-                <a:lumOff val="75000"/>
-              </a:schemeClr>
-            </a:solidFill>
-          </a:ln>
         </p:spPr>
       </p:pic>
       <p:pic>
         <p:nvPicPr>
-          <p:cNvPr id="9" name="Picture 8">
+          <p:cNvPr id="7" name="Picture 6" descr="Graphical user interface, application&#10;&#10;Description automatically generated">
             <a:extLst>
               <a:ext uri="{FF2B5EF4-FFF2-40B4-BE49-F238E27FC236}">
-                <a16:creationId xmlns:a16="http://schemas.microsoft.com/office/drawing/2014/main" id="{10C02BBF-366B-4FB6-A8E7-9EA98452D82D}"/>
+                <a16:creationId xmlns:a16="http://schemas.microsoft.com/office/drawing/2014/main" id="{7FD1CDA7-65D6-49F4-B9E5-1D3B0F009CED}"/>
               </a:ext>
             </a:extLst>
           </p:cNvPr>
@@ -18814,31 +18458,20 @@
         </p:blipFill>
         <p:spPr>
           <a:xfrm>
-            <a:off x="7322532" y="1409298"/>
-            <a:ext cx="4831368" cy="3156259"/>
+            <a:off x="465138" y="3603420"/>
+            <a:ext cx="4037651" cy="2750650"/>
           </a:xfrm>
           <a:prstGeom prst="rect">
             <a:avLst/>
           </a:prstGeom>
-          <a:solidFill>
-            <a:schemeClr val="bg2"/>
-          </a:solidFill>
-          <a:ln>
-            <a:solidFill>
-              <a:schemeClr val="tx1">
-                <a:lumMod val="25000"/>
-                <a:lumOff val="75000"/>
-              </a:schemeClr>
-            </a:solidFill>
-          </a:ln>
         </p:spPr>
       </p:pic>
       <p:pic>
         <p:nvPicPr>
-          <p:cNvPr id="14" name="Picture 13">
+          <p:cNvPr id="10" name="Picture 9" descr="Graphical user interface, application&#10;&#10;Description automatically generated">
             <a:extLst>
               <a:ext uri="{FF2B5EF4-FFF2-40B4-BE49-F238E27FC236}">
-                <a16:creationId xmlns:a16="http://schemas.microsoft.com/office/drawing/2014/main" id="{66D93669-C000-4B24-B591-0547BFB2378B}"/>
+                <a16:creationId xmlns:a16="http://schemas.microsoft.com/office/drawing/2014/main" id="{B77F112C-5972-47A8-8E25-D70E3F58A5E7}"/>
               </a:ext>
             </a:extLst>
           </p:cNvPr>
@@ -18855,277 +18488,14 @@
         </p:blipFill>
         <p:spPr>
           <a:xfrm>
-            <a:off x="2489739" y="1420119"/>
-            <a:ext cx="4514754" cy="2155795"/>
+            <a:off x="5118769" y="1420632"/>
+            <a:ext cx="6852568" cy="4205764"/>
           </a:xfrm>
           <a:prstGeom prst="rect">
             <a:avLst/>
           </a:prstGeom>
-          <a:ln>
-            <a:solidFill>
-              <a:schemeClr val="tx1">
-                <a:lumMod val="25000"/>
-                <a:lumOff val="75000"/>
-              </a:schemeClr>
-            </a:solidFill>
-          </a:ln>
         </p:spPr>
       </p:pic>
-      <p:sp>
-        <p:nvSpPr>
-          <p:cNvPr id="15" name="Flowchart: Connector 14">
-            <a:extLst>
-              <a:ext uri="{FF2B5EF4-FFF2-40B4-BE49-F238E27FC236}">
-                <a16:creationId xmlns:a16="http://schemas.microsoft.com/office/drawing/2014/main" id="{1FAD56AE-5F0A-4C59-8423-FE4BF716AFAC}"/>
-              </a:ext>
-            </a:extLst>
-          </p:cNvPr>
-          <p:cNvSpPr/>
-          <p:nvPr/>
-        </p:nvSpPr>
-        <p:spPr bwMode="auto">
-          <a:xfrm>
-            <a:off x="1612900" y="3101376"/>
-            <a:ext cx="558800" cy="474538"/>
-          </a:xfrm>
-          <a:prstGeom prst="flowChartConnector">
-            <a:avLst/>
-          </a:prstGeom>
-          <a:solidFill>
-            <a:schemeClr val="accent1"/>
-          </a:solidFill>
-          <a:ln>
-            <a:noFill/>
-            <a:headEnd type="none" w="med" len="med"/>
-            <a:tailEnd type="none" w="med" len="med"/>
-          </a:ln>
-          <a:effectLst/>
-        </p:spPr>
-        <p:style>
-          <a:lnRef idx="1">
-            <a:schemeClr val="accent2"/>
-          </a:lnRef>
-          <a:fillRef idx="3">
-            <a:schemeClr val="accent2"/>
-          </a:fillRef>
-          <a:effectRef idx="2">
-            <a:schemeClr val="accent2"/>
-          </a:effectRef>
-          <a:fontRef idx="minor">
-            <a:schemeClr val="lt1"/>
-          </a:fontRef>
-        </p:style>
-        <p:txBody>
-          <a:bodyPr rot="0" spcFirstLastPara="0" vertOverflow="overflow" horzOverflow="overflow" vert="horz" wrap="square" lIns="182880" tIns="146304" rIns="182880" bIns="146304" numCol="1" spcCol="0" rtlCol="0" fromWordArt="0" anchor="ctr" anchorCtr="0" forceAA="0" compatLnSpc="1">
-            <a:prstTxWarp prst="textNoShape">
-              <a:avLst/>
-            </a:prstTxWarp>
-            <a:noAutofit/>
-          </a:bodyPr>
-          <a:lstStyle/>
-          <a:p>
-            <a:pPr algn="ctr" defTabSz="932472" fontAlgn="base">
-              <a:lnSpc>
-                <a:spcPct val="90000"/>
-              </a:lnSpc>
-              <a:spcBef>
-                <a:spcPct val="0"/>
-              </a:spcBef>
-              <a:spcAft>
-                <a:spcPct val="0"/>
-              </a:spcAft>
-            </a:pPr>
-            <a:r>
-              <a:rPr lang="en-US" sz="2400" dirty="0">
-                <a:gradFill>
-                  <a:gsLst>
-                    <a:gs pos="0">
-                      <a:srgbClr val="FFFFFF"/>
-                    </a:gs>
-                    <a:gs pos="100000">
-                      <a:srgbClr val="FFFFFF"/>
-                    </a:gs>
-                  </a:gsLst>
-                  <a:lin ang="5400000" scaled="0"/>
-                </a:gradFill>
-                <a:ea typeface="Segoe UI" pitchFamily="34" charset="0"/>
-                <a:cs typeface="Segoe UI" pitchFamily="34" charset="0"/>
-              </a:rPr>
-              <a:t>1</a:t>
-            </a:r>
-          </a:p>
-        </p:txBody>
-      </p:sp>
-      <p:sp>
-        <p:nvSpPr>
-          <p:cNvPr id="16" name="Flowchart: Connector 15">
-            <a:extLst>
-              <a:ext uri="{FF2B5EF4-FFF2-40B4-BE49-F238E27FC236}">
-                <a16:creationId xmlns:a16="http://schemas.microsoft.com/office/drawing/2014/main" id="{C54E29AF-3D46-4D5D-A17B-EB47BF31695C}"/>
-              </a:ext>
-            </a:extLst>
-          </p:cNvPr>
-          <p:cNvSpPr/>
-          <p:nvPr/>
-        </p:nvSpPr>
-        <p:spPr bwMode="auto">
-          <a:xfrm>
-            <a:off x="6445693" y="3101376"/>
-            <a:ext cx="558800" cy="474538"/>
-          </a:xfrm>
-          <a:prstGeom prst="flowChartConnector">
-            <a:avLst/>
-          </a:prstGeom>
-          <a:solidFill>
-            <a:schemeClr val="accent1"/>
-          </a:solidFill>
-          <a:ln>
-            <a:noFill/>
-            <a:headEnd type="none" w="med" len="med"/>
-            <a:tailEnd type="none" w="med" len="med"/>
-          </a:ln>
-          <a:effectLst/>
-        </p:spPr>
-        <p:style>
-          <a:lnRef idx="1">
-            <a:schemeClr val="accent2"/>
-          </a:lnRef>
-          <a:fillRef idx="3">
-            <a:schemeClr val="accent2"/>
-          </a:fillRef>
-          <a:effectRef idx="2">
-            <a:schemeClr val="accent2"/>
-          </a:effectRef>
-          <a:fontRef idx="minor">
-            <a:schemeClr val="lt1"/>
-          </a:fontRef>
-        </p:style>
-        <p:txBody>
-          <a:bodyPr rot="0" spcFirstLastPara="0" vertOverflow="overflow" horzOverflow="overflow" vert="horz" wrap="square" lIns="182880" tIns="146304" rIns="182880" bIns="146304" numCol="1" spcCol="0" rtlCol="0" fromWordArt="0" anchor="ctr" anchorCtr="0" forceAA="0" compatLnSpc="1">
-            <a:prstTxWarp prst="textNoShape">
-              <a:avLst/>
-            </a:prstTxWarp>
-            <a:noAutofit/>
-          </a:bodyPr>
-          <a:lstStyle/>
-          <a:p>
-            <a:pPr algn="ctr" defTabSz="932472" fontAlgn="base">
-              <a:lnSpc>
-                <a:spcPct val="90000"/>
-              </a:lnSpc>
-              <a:spcBef>
-                <a:spcPct val="0"/>
-              </a:spcBef>
-              <a:spcAft>
-                <a:spcPct val="0"/>
-              </a:spcAft>
-            </a:pPr>
-            <a:r>
-              <a:rPr lang="en-US" sz="2400" dirty="0">
-                <a:gradFill>
-                  <a:gsLst>
-                    <a:gs pos="0">
-                      <a:srgbClr val="FFFFFF"/>
-                    </a:gs>
-                    <a:gs pos="100000">
-                      <a:srgbClr val="FFFFFF"/>
-                    </a:gs>
-                  </a:gsLst>
-                  <a:lin ang="5400000" scaled="0"/>
-                </a:gradFill>
-                <a:ea typeface="Segoe UI" pitchFamily="34" charset="0"/>
-                <a:cs typeface="Segoe UI" pitchFamily="34" charset="0"/>
-              </a:rPr>
-              <a:t>2</a:t>
-            </a:r>
-          </a:p>
-        </p:txBody>
-      </p:sp>
-      <p:sp>
-        <p:nvSpPr>
-          <p:cNvPr id="17" name="Flowchart: Connector 16">
-            <a:extLst>
-              <a:ext uri="{FF2B5EF4-FFF2-40B4-BE49-F238E27FC236}">
-                <a16:creationId xmlns:a16="http://schemas.microsoft.com/office/drawing/2014/main" id="{DE63B18E-EF02-401F-B1DE-BD2F94A6D581}"/>
-              </a:ext>
-            </a:extLst>
-          </p:cNvPr>
-          <p:cNvSpPr/>
-          <p:nvPr/>
-        </p:nvSpPr>
-        <p:spPr bwMode="auto">
-          <a:xfrm>
-            <a:off x="11595100" y="4091019"/>
-            <a:ext cx="558800" cy="474538"/>
-          </a:xfrm>
-          <a:prstGeom prst="flowChartConnector">
-            <a:avLst/>
-          </a:prstGeom>
-          <a:solidFill>
-            <a:schemeClr val="accent1"/>
-          </a:solidFill>
-          <a:ln>
-            <a:noFill/>
-            <a:headEnd type="none" w="med" len="med"/>
-            <a:tailEnd type="none" w="med" len="med"/>
-          </a:ln>
-          <a:effectLst/>
-        </p:spPr>
-        <p:style>
-          <a:lnRef idx="1">
-            <a:schemeClr val="accent2"/>
-          </a:lnRef>
-          <a:fillRef idx="3">
-            <a:schemeClr val="accent2"/>
-          </a:fillRef>
-          <a:effectRef idx="2">
-            <a:schemeClr val="accent2"/>
-          </a:effectRef>
-          <a:fontRef idx="minor">
-            <a:schemeClr val="lt1"/>
-          </a:fontRef>
-        </p:style>
-        <p:txBody>
-          <a:bodyPr rot="0" spcFirstLastPara="0" vertOverflow="overflow" horzOverflow="overflow" vert="horz" wrap="square" lIns="182880" tIns="146304" rIns="182880" bIns="146304" numCol="1" spcCol="0" rtlCol="0" fromWordArt="0" anchor="ctr" anchorCtr="0" forceAA="0" compatLnSpc="1">
-            <a:prstTxWarp prst="textNoShape">
-              <a:avLst/>
-            </a:prstTxWarp>
-            <a:noAutofit/>
-          </a:bodyPr>
-          <a:lstStyle/>
-          <a:p>
-            <a:pPr algn="ctr" defTabSz="932472" fontAlgn="base">
-              <a:lnSpc>
-                <a:spcPct val="90000"/>
-              </a:lnSpc>
-              <a:spcBef>
-                <a:spcPct val="0"/>
-              </a:spcBef>
-              <a:spcAft>
-                <a:spcPct val="0"/>
-              </a:spcAft>
-            </a:pPr>
-            <a:r>
-              <a:rPr lang="en-US" sz="2400" dirty="0">
-                <a:gradFill>
-                  <a:gsLst>
-                    <a:gs pos="0">
-                      <a:srgbClr val="FFFFFF"/>
-                    </a:gs>
-                    <a:gs pos="100000">
-                      <a:srgbClr val="FFFFFF"/>
-                    </a:gs>
-                  </a:gsLst>
-                  <a:lin ang="5400000" scaled="0"/>
-                </a:gradFill>
-                <a:ea typeface="Segoe UI" pitchFamily="34" charset="0"/>
-                <a:cs typeface="Segoe UI" pitchFamily="34" charset="0"/>
-              </a:rPr>
-              <a:t>3</a:t>
-            </a:r>
-          </a:p>
-        </p:txBody>
-      </p:sp>
     </p:spTree>
     <p:extLst>
       <p:ext uri="{BB962C8B-B14F-4D97-AF65-F5344CB8AC3E}">
@@ -19183,7 +18553,7 @@
             </a:br>
             <a:r>
               <a:rPr lang="en-US" sz="2400" dirty="0"/>
-              <a:t>Testing the Web Part in the Local &amp; Hosted Workbench</a:t>
+              <a:t>Testing the Web Part in the SharePoint-hosted Workbench</a:t>
             </a:r>
             <a:endParaRPr lang="en-US" dirty="0"/>
           </a:p>

</xml_diff>